<commit_message>
Small update of materials
</commit_message>
<xml_diff>
--- a/Teleconference/20200626/00-agenda_01.pptx
+++ b/Teleconference/20200626/00-agenda_01.pptx
@@ -4117,7 +4117,7 @@
           <p:nvPr>
             <p:extLst>
               <p:ext uri="{D42A27DB-BD31-4B8C-83A1-F6EECF244321}">
-                <p14:modId xmlns:p14="http://schemas.microsoft.com/office/powerpoint/2010/main" val="3475747000"/>
+                <p14:modId xmlns:p14="http://schemas.microsoft.com/office/powerpoint/2010/main" val="467245050"/>
               </p:ext>
             </p:extLst>
           </p:nvPr>
@@ -4300,7 +4300,14 @@
                           <a:latin typeface="Meiryo UI" panose="020B0604030504040204" pitchFamily="34" charset="-128"/>
                           <a:ea typeface="Meiryo UI" panose="020B0604030504040204" pitchFamily="34" charset="-128"/>
                         </a:rPr>
-                        <a:t>Node-RED 1.2 and later</a:t>
+                        <a:t>Node-RED 1.2 </a:t>
+                      </a:r>
+                      <a:r>
+                        <a:rPr kumimoji="1" lang="en-US" altLang="ja-JP" sz="2000">
+                          <a:latin typeface="Meiryo UI" panose="020B0604030504040204" pitchFamily="34" charset="-128"/>
+                          <a:ea typeface="Meiryo UI" panose="020B0604030504040204" pitchFamily="34" charset="-128"/>
+                        </a:rPr>
+                        <a:t>and beyond</a:t>
                       </a:r>
                       <a:endParaRPr kumimoji="1" lang="ja-JP" altLang="en-US" sz="2000">
                         <a:latin typeface="Meiryo UI" panose="020B0604030504040204" pitchFamily="34" charset="-128"/>
@@ -6033,14 +6040,12 @@
 </file>
 
 <file path=customXml/item1.xml><?xml version="1.0" encoding="utf-8"?>
-<p:properties xmlns:p="http://schemas.microsoft.com/office/2006/metadata/properties" xmlns:xsi="http://www.w3.org/2001/XMLSchema-instance" xmlns:pc="http://schemas.microsoft.com/office/infopath/2007/PartnerControls">
-  <documentManagement>
-    <UniquePath xmlns="1e78d572-3cd7-4422-acd1-43e60bd62168" xsi:nil="true"/>
-    <_x5143__x306e__x30d1__x30b9_ xmlns="1e78d572-3cd7-4422-acd1-43e60bd62168" xsi:nil="true"/>
-    <Date_x0020_Modified xmlns="1e78d572-3cd7-4422-acd1-43e60bd62168" xsi:nil="true"/>
-    <_x5143__x306e__x89aa__x30d5__x30a9__x30eb__x30c0_ xmlns="1e78d572-3cd7-4422-acd1-43e60bd62168" xsi:nil="true"/>
-  </documentManagement>
-</p:properties>
+<?mso-contentType ?>
+<FormTemplates xmlns="http://schemas.microsoft.com/sharepoint/v3/contenttype/forms">
+  <Display>DocumentLibraryForm</Display>
+  <Edit>DocumentLibraryForm</Edit>
+  <New>DocumentLibraryForm</New>
+</FormTemplates>
 </file>
 
 <file path=customXml/item2.xml><?xml version="1.0" encoding="utf-8"?>
@@ -6291,27 +6296,20 @@
 </file>
 
 <file path=customXml/item3.xml><?xml version="1.0" encoding="utf-8"?>
-<?mso-contentType ?>
-<FormTemplates xmlns="http://schemas.microsoft.com/sharepoint/v3/contenttype/forms">
-  <Display>DocumentLibraryForm</Display>
-  <Edit>DocumentLibraryForm</Edit>
-  <New>DocumentLibraryForm</New>
-</FormTemplates>
+<p:properties xmlns:p="http://schemas.microsoft.com/office/2006/metadata/properties" xmlns:xsi="http://www.w3.org/2001/XMLSchema-instance" xmlns:pc="http://schemas.microsoft.com/office/infopath/2007/PartnerControls">
+  <documentManagement>
+    <UniquePath xmlns="1e78d572-3cd7-4422-acd1-43e60bd62168" xsi:nil="true"/>
+    <_x5143__x306e__x30d1__x30b9_ xmlns="1e78d572-3cd7-4422-acd1-43e60bd62168" xsi:nil="true"/>
+    <Date_x0020_Modified xmlns="1e78d572-3cd7-4422-acd1-43e60bd62168" xsi:nil="true"/>
+    <_x5143__x306e__x89aa__x30d5__x30a9__x30eb__x30c0_ xmlns="1e78d572-3cd7-4422-acd1-43e60bd62168" xsi:nil="true"/>
+  </documentManagement>
+</p:properties>
 </file>
 
 <file path=customXml/itemProps1.xml><?xml version="1.0" encoding="utf-8"?>
-<ds:datastoreItem xmlns:ds="http://schemas.openxmlformats.org/officeDocument/2006/customXml" ds:itemID="{BA316F28-D208-4415-9364-9798B60EAF8D}">
+<ds:datastoreItem xmlns:ds="http://schemas.openxmlformats.org/officeDocument/2006/customXml" ds:itemID="{003798FF-2832-4538-A1D6-7268BE217D5F}">
   <ds:schemaRefs>
-    <ds:schemaRef ds:uri="http://schemas.microsoft.com/sharepoint/v3"/>
-    <ds:schemaRef ds:uri="http://schemas.microsoft.com/office/2006/documentManagement/types"/>
-    <ds:schemaRef ds:uri="http://www.w3.org/XML/1998/namespace"/>
-    <ds:schemaRef ds:uri="http://purl.org/dc/dcmitype/"/>
-    <ds:schemaRef ds:uri="http://schemas.microsoft.com/office/infopath/2007/PartnerControls"/>
-    <ds:schemaRef ds:uri="http://purl.org/dc/elements/1.1/"/>
-    <ds:schemaRef ds:uri="http://purl.org/dc/terms/"/>
-    <ds:schemaRef ds:uri="http://schemas.openxmlformats.org/package/2006/metadata/core-properties"/>
-    <ds:schemaRef ds:uri="http://schemas.microsoft.com/office/2006/metadata/properties"/>
-    <ds:schemaRef ds:uri="1e78d572-3cd7-4422-acd1-43e60bd62168"/>
+    <ds:schemaRef ds:uri="http://schemas.microsoft.com/sharepoint/v3/contenttype/forms"/>
   </ds:schemaRefs>
 </ds:datastoreItem>
 </file>
@@ -6336,9 +6334,18 @@
 </file>
 
 <file path=customXml/itemProps3.xml><?xml version="1.0" encoding="utf-8"?>
-<ds:datastoreItem xmlns:ds="http://schemas.openxmlformats.org/officeDocument/2006/customXml" ds:itemID="{003798FF-2832-4538-A1D6-7268BE217D5F}">
+<ds:datastoreItem xmlns:ds="http://schemas.openxmlformats.org/officeDocument/2006/customXml" ds:itemID="{BA316F28-D208-4415-9364-9798B60EAF8D}">
   <ds:schemaRefs>
-    <ds:schemaRef ds:uri="http://schemas.microsoft.com/sharepoint/v3/contenttype/forms"/>
+    <ds:schemaRef ds:uri="http://schemas.microsoft.com/sharepoint/v3"/>
+    <ds:schemaRef ds:uri="http://schemas.microsoft.com/office/2006/documentManagement/types"/>
+    <ds:schemaRef ds:uri="http://www.w3.org/XML/1998/namespace"/>
+    <ds:schemaRef ds:uri="http://purl.org/dc/dcmitype/"/>
+    <ds:schemaRef ds:uri="http://schemas.microsoft.com/office/infopath/2007/PartnerControls"/>
+    <ds:schemaRef ds:uri="http://purl.org/dc/elements/1.1/"/>
+    <ds:schemaRef ds:uri="http://purl.org/dc/terms/"/>
+    <ds:schemaRef ds:uri="http://schemas.openxmlformats.org/package/2006/metadata/core-properties"/>
+    <ds:schemaRef ds:uri="http://schemas.microsoft.com/office/2006/metadata/properties"/>
+    <ds:schemaRef ds:uri="1e78d572-3cd7-4422-acd1-43e60bd62168"/>
   </ds:schemaRefs>
 </ds:datastoreItem>
 </file>
</xml_diff>